<commit_message>
Add files associated with introduction of nCurses 6.0 (32-bit and 64-bit) and Python 3.6.0. Update documents to fix typographical errors, clarify design descriptions and plan for use of SWIG and CMake to suppoty fu;; nCurses API instead of just AT&T Curses-based PythonStandard Curses module's minimal subset API.
Signed-off-by: unknown <C:\Users\rigor\AppData\Roaming\The Bat!>
</commit_message>
<xml_diff>
--- a/Notebooks/EngineeringNotebook/MS-PowerPoint-Files/tsWxGTUI_PyVx/Introduction.pptx
+++ b/Notebooks/EngineeringNotebook/MS-PowerPoint-Files/tsWxGTUI_PyVx/Introduction.pptx
@@ -290,7 +290,7 @@
               <a:pPr>
                 <a:defRPr/>
               </a:pPr>
-              <a:t>11/29/2015</a:t>
+              <a:t>12/23/2016</a:t>
             </a:fld>
             <a:endParaRPr lang="en-US"/>
           </a:p>
@@ -527,7 +527,7 @@
               <a:pPr>
                 <a:defRPr/>
               </a:pPr>
-              <a:t>11/29/2015</a:t>
+              <a:t>12/23/2016</a:t>
             </a:fld>
             <a:endParaRPr lang="en-US"/>
           </a:p>
@@ -599,35 +599,35 @@
           <a:p>
             <a:pPr lvl="0"/>
             <a:r>
-              <a:rPr lang="en-US" noProof="0" smtClean="0"/>
+              <a:rPr lang="en-US" noProof="0"/>
               <a:t>Click to edit Master text styles</a:t>
             </a:r>
           </a:p>
           <a:p>
             <a:pPr lvl="1"/>
             <a:r>
-              <a:rPr lang="en-US" noProof="0" smtClean="0"/>
+              <a:rPr lang="en-US" noProof="0"/>
               <a:t>Second level</a:t>
             </a:r>
           </a:p>
           <a:p>
             <a:pPr lvl="2"/>
             <a:r>
-              <a:rPr lang="en-US" noProof="0" smtClean="0"/>
+              <a:rPr lang="en-US" noProof="0"/>
               <a:t>Third level</a:t>
             </a:r>
           </a:p>
           <a:p>
             <a:pPr lvl="3"/>
             <a:r>
-              <a:rPr lang="en-US" noProof="0" smtClean="0"/>
+              <a:rPr lang="en-US" noProof="0"/>
               <a:t>Fourth level</a:t>
             </a:r>
           </a:p>
           <a:p>
             <a:pPr lvl="4"/>
             <a:r>
-              <a:rPr lang="en-US" noProof="0" smtClean="0"/>
+              <a:rPr lang="en-US" noProof="0"/>
               <a:t>Fifth level</a:t>
             </a:r>
           </a:p>
@@ -914,7 +914,7 @@
           <a:lstStyle/>
           <a:p>
             <a:pPr eaLnBrk="1" hangingPunct="1"/>
-            <a:endParaRPr lang="en-US" dirty="0" smtClean="0"/>
+            <a:endParaRPr lang="en-US" dirty="0"/>
           </a:p>
         </p:txBody>
       </p:sp>
@@ -981,7 +981,7 @@
           <a:lstStyle/>
           <a:p>
             <a:pPr eaLnBrk="1" hangingPunct="1"/>
-            <a:endParaRPr lang="en-US" dirty="0" smtClean="0"/>
+            <a:endParaRPr lang="en-US" dirty="0"/>
           </a:p>
         </p:txBody>
       </p:sp>
@@ -1440,7 +1440,7 @@
             </a:pPr>
             <a:fld id="{B5B52024-79AA-4062-8229-397D9E214550}" type="datetime1">
               <a:rPr lang="en-US" smtClean="0"/>
-              <a:t>11/29/2015</a:t>
+              <a:t>12/23/2016</a:t>
             </a:fld>
             <a:endParaRPr lang="en-US"/>
           </a:p>
@@ -1478,10 +1478,9 @@
               <a:defRPr/>
             </a:pPr>
             <a:r>
-              <a:rPr lang="en-US" dirty="0" smtClean="0"/>
+              <a:rPr lang="en-US" dirty="0"/>
               <a:t>TeamSTARS "tsWxGTUI_PyVx" Toolkit prepared &amp; presented by Richard S. Gordon</a:t>
             </a:r>
-            <a:endParaRPr lang="en-US" dirty="0"/>
           </a:p>
         </p:txBody>
       </p:sp>
@@ -1646,7 +1645,7 @@
             </a:pPr>
             <a:fld id="{5534B48B-48D4-4D1F-B98F-2ED8E1B04ED0}" type="datetime1">
               <a:rPr lang="en-US" smtClean="0"/>
-              <a:t>11/29/2015</a:t>
+              <a:t>12/23/2016</a:t>
             </a:fld>
             <a:endParaRPr lang="en-US"/>
           </a:p>
@@ -1677,10 +1676,9 @@
               <a:defRPr/>
             </a:pPr>
             <a:r>
-              <a:rPr lang="en-US" dirty="0" smtClean="0"/>
+              <a:rPr lang="en-US" dirty="0"/>
               <a:t>TeamSTARS "tsWxGTUI_PyVx" Toolkit prepared &amp; presented by Richard S. Gordon</a:t>
             </a:r>
-            <a:endParaRPr lang="en-US" dirty="0"/>
           </a:p>
         </p:txBody>
       </p:sp>
@@ -1848,7 +1846,7 @@
             </a:pPr>
             <a:fld id="{C3557E2B-7DD4-4DCF-9DDD-7786167218C6}" type="datetime1">
               <a:rPr lang="en-US" smtClean="0"/>
-              <a:t>11/29/2015</a:t>
+              <a:t>12/23/2016</a:t>
             </a:fld>
             <a:endParaRPr lang="en-US"/>
           </a:p>
@@ -1879,10 +1877,9 @@
               <a:defRPr/>
             </a:pPr>
             <a:r>
-              <a:rPr lang="en-US" dirty="0" smtClean="0"/>
+              <a:rPr lang="en-US" dirty="0"/>
               <a:t>TeamSTARS "tsWxGTUI_PyVx" Toolkit prepared &amp; presented by Richard S. Gordon</a:t>
             </a:r>
-            <a:endParaRPr lang="en-US" dirty="0"/>
           </a:p>
         </p:txBody>
       </p:sp>
@@ -2043,7 +2040,7 @@
               <a:pPr>
                 <a:defRPr/>
               </a:pPr>
-              <a:t>11/29/2015</a:t>
+              <a:t>12/23/2016</a:t>
             </a:fld>
             <a:endParaRPr lang="en-US" dirty="0"/>
           </a:p>
@@ -2074,22 +2071,21 @@
               <a:defRPr/>
             </a:pPr>
             <a:r>
-              <a:rPr lang="en-US" dirty="0" err="1" smtClean="0"/>
+              <a:rPr lang="en-US" dirty="0" err="1"/>
               <a:t>TeamSTARS</a:t>
             </a:r>
             <a:r>
-              <a:rPr lang="en-US" dirty="0" smtClean="0"/>
+              <a:rPr lang="en-US" dirty="0"/>
               <a:t> "</a:t>
             </a:r>
             <a:r>
-              <a:rPr lang="en-US" dirty="0" err="1" smtClean="0"/>
+              <a:rPr lang="en-US" dirty="0" err="1"/>
               <a:t>tsWxGTUI_PyVx</a:t>
             </a:r>
             <a:r>
-              <a:rPr lang="en-US" dirty="0" smtClean="0"/>
+              <a:rPr lang="en-US" dirty="0"/>
               <a:t>" Toolkit prepared &amp; presented by Richard S. Gordon</a:t>
             </a:r>
-            <a:endParaRPr lang="en-US" dirty="0"/>
           </a:p>
         </p:txBody>
       </p:sp>
@@ -2270,7 +2266,7 @@
             </a:pPr>
             <a:fld id="{013FB6F9-CFEF-47AA-A08B-D90CED01DE9A}" type="datetime1">
               <a:rPr lang="en-US" smtClean="0"/>
-              <a:t>11/29/2015</a:t>
+              <a:t>12/23/2016</a:t>
             </a:fld>
             <a:endParaRPr lang="en-US"/>
           </a:p>
@@ -2301,10 +2297,9 @@
               <a:defRPr/>
             </a:pPr>
             <a:r>
-              <a:rPr lang="en-US" dirty="0" smtClean="0"/>
+              <a:rPr lang="en-US" dirty="0"/>
               <a:t>TeamSTARS "tsWxGTUI_PyVx" Toolkit prepared &amp; presented by Richard S. Gordon</a:t>
             </a:r>
-            <a:endParaRPr lang="en-US" dirty="0"/>
           </a:p>
         </p:txBody>
       </p:sp>
@@ -2579,7 +2574,7 @@
             </a:pPr>
             <a:fld id="{44D06F95-D493-494F-B0EB-3EDFAA385886}" type="datetime1">
               <a:rPr lang="en-US" smtClean="0"/>
-              <a:t>11/29/2015</a:t>
+              <a:t>12/23/2016</a:t>
             </a:fld>
             <a:endParaRPr lang="en-US"/>
           </a:p>
@@ -2610,10 +2605,9 @@
               <a:defRPr/>
             </a:pPr>
             <a:r>
-              <a:rPr lang="en-US" dirty="0" smtClean="0"/>
+              <a:rPr lang="en-US" dirty="0"/>
               <a:t>TeamSTARS "tsWxGTUI_PyVx" Toolkit prepared &amp; presented by Richard S. Gordon</a:t>
             </a:r>
-            <a:endParaRPr lang="en-US" dirty="0"/>
           </a:p>
         </p:txBody>
       </p:sp>
@@ -3027,7 +3021,7 @@
             </a:pPr>
             <a:fld id="{26FA81D3-96E1-4758-9306-72CE9F6E2F25}" type="datetime1">
               <a:rPr lang="en-US" smtClean="0"/>
-              <a:t>11/29/2015</a:t>
+              <a:t>12/23/2016</a:t>
             </a:fld>
             <a:endParaRPr lang="en-US"/>
           </a:p>
@@ -3058,10 +3052,9 @@
               <a:defRPr/>
             </a:pPr>
             <a:r>
-              <a:rPr lang="en-US" dirty="0" smtClean="0"/>
+              <a:rPr lang="en-US" dirty="0"/>
               <a:t>TeamSTARS "tsWxGTUI_PyVx" Toolkit prepared &amp; presented by Richard S. Gordon</a:t>
             </a:r>
-            <a:endParaRPr lang="en-US" dirty="0"/>
           </a:p>
         </p:txBody>
       </p:sp>
@@ -3168,7 +3161,7 @@
             </a:pPr>
             <a:fld id="{C22C02A3-FDB2-4B02-8110-311DDD8475C2}" type="datetime1">
               <a:rPr lang="en-US" smtClean="0"/>
-              <a:t>11/29/2015</a:t>
+              <a:t>12/23/2016</a:t>
             </a:fld>
             <a:endParaRPr lang="en-US"/>
           </a:p>
@@ -3199,10 +3192,9 @@
               <a:defRPr/>
             </a:pPr>
             <a:r>
-              <a:rPr lang="en-US" dirty="0" smtClean="0"/>
+              <a:rPr lang="en-US" dirty="0"/>
               <a:t>TeamSTARS "tsWxGTUI_PyVx" Toolkit prepared &amp; presented by Richard S. Gordon</a:t>
             </a:r>
-            <a:endParaRPr lang="en-US" dirty="0"/>
           </a:p>
         </p:txBody>
       </p:sp>
@@ -3285,7 +3277,7 @@
             </a:pPr>
             <a:fld id="{FB277746-3C8E-4161-A66B-B97D4FD5213A}" type="datetime1">
               <a:rPr lang="en-US" smtClean="0"/>
-              <a:t>11/29/2015</a:t>
+              <a:t>12/23/2016</a:t>
             </a:fld>
             <a:endParaRPr lang="en-US"/>
           </a:p>
@@ -3579,7 +3571,7 @@
             </a:pPr>
             <a:fld id="{86B778C6-FEB5-4910-BBA7-BBA76466D3B2}" type="datetime1">
               <a:rPr lang="en-US" smtClean="0"/>
-              <a:t>11/29/2015</a:t>
+              <a:t>12/23/2016</a:t>
             </a:fld>
             <a:endParaRPr lang="en-US"/>
           </a:p>
@@ -3610,10 +3602,9 @@
               <a:defRPr/>
             </a:pPr>
             <a:r>
-              <a:rPr lang="en-US" dirty="0" smtClean="0"/>
+              <a:rPr lang="en-US" dirty="0"/>
               <a:t>TeamSTARS "tsWxGTUI_PyVx" Toolkit prepared &amp; presented by Richard S. Gordon</a:t>
             </a:r>
-            <a:endParaRPr lang="en-US" dirty="0"/>
           </a:p>
         </p:txBody>
       </p:sp>
@@ -3856,7 +3847,7 @@
             </a:pPr>
             <a:fld id="{7A68BEE5-7335-4799-9F53-F65CFD274630}" type="datetime1">
               <a:rPr lang="en-US" smtClean="0"/>
-              <a:t>11/29/2015</a:t>
+              <a:t>12/23/2016</a:t>
             </a:fld>
             <a:endParaRPr lang="en-US"/>
           </a:p>
@@ -3887,10 +3878,9 @@
               <a:defRPr/>
             </a:pPr>
             <a:r>
-              <a:rPr lang="en-US" dirty="0" smtClean="0"/>
+              <a:rPr lang="en-US" dirty="0"/>
               <a:t>TeamSTARS "tsWxGTUI_PyVx" Toolkit prepared &amp; presented by Richard S. Gordon</a:t>
             </a:r>
-            <a:endParaRPr lang="en-US" dirty="0"/>
           </a:p>
         </p:txBody>
       </p:sp>
@@ -4270,7 +4260,7 @@
           <a:p>
             <a:pPr lvl="0"/>
             <a:r>
-              <a:rPr lang="en-US" smtClean="0"/>
+              <a:rPr lang="en-US"/>
               <a:t>Click to edit Master title style</a:t>
             </a:r>
           </a:p>
@@ -4312,35 +4302,35 @@
           <a:p>
             <a:pPr lvl="0"/>
             <a:r>
-              <a:rPr lang="en-US" smtClean="0"/>
+              <a:rPr lang="en-US"/>
               <a:t>Click to edit Master text styles</a:t>
             </a:r>
           </a:p>
           <a:p>
             <a:pPr lvl="1"/>
             <a:r>
-              <a:rPr lang="en-US" smtClean="0"/>
+              <a:rPr lang="en-US"/>
               <a:t>Second level</a:t>
             </a:r>
           </a:p>
           <a:p>
             <a:pPr lvl="2"/>
             <a:r>
-              <a:rPr lang="en-US" smtClean="0"/>
+              <a:rPr lang="en-US"/>
               <a:t>Third level</a:t>
             </a:r>
           </a:p>
           <a:p>
             <a:pPr lvl="3"/>
             <a:r>
-              <a:rPr lang="en-US" smtClean="0"/>
+              <a:rPr lang="en-US"/>
               <a:t>Fourth level</a:t>
             </a:r>
           </a:p>
           <a:p>
             <a:pPr lvl="4"/>
             <a:r>
-              <a:rPr lang="en-US" smtClean="0"/>
+              <a:rPr lang="en-US"/>
               <a:t>Fifth level</a:t>
             </a:r>
           </a:p>
@@ -4390,7 +4380,7 @@
             </a:pPr>
             <a:fld id="{45A933D1-86C7-45FF-B83F-CA5ED825AD11}" type="datetime1">
               <a:rPr lang="en-US" smtClean="0"/>
-              <a:t>11/29/2015</a:t>
+              <a:t>12/23/2016</a:t>
             </a:fld>
             <a:endParaRPr lang="en-US"/>
           </a:p>
@@ -4439,10 +4429,9 @@
               <a:defRPr/>
             </a:pPr>
             <a:r>
-              <a:rPr lang="en-US" dirty="0" smtClean="0"/>
+              <a:rPr lang="en-US" dirty="0"/>
               <a:t>TeamSTARS "tsWxGTUI_PyVx" Toolkit prepared &amp; presented by Richard S. Gordon</a:t>
             </a:r>
-            <a:endParaRPr lang="en-US" dirty="0"/>
           </a:p>
         </p:txBody>
       </p:sp>
@@ -4974,10 +4963,9 @@
           <a:lstStyle/>
           <a:p>
             <a:r>
-              <a:rPr lang="en-US" dirty="0" smtClean="0"/>
+              <a:rPr lang="en-US" dirty="0"/>
               <a:t>Introduction</a:t>
             </a:r>
-            <a:endParaRPr lang="en-US" dirty="0"/>
           </a:p>
         </p:txBody>
       </p:sp>
@@ -5000,14 +4988,14 @@
               <a:buFont typeface="Wingdings" pitchFamily="2" charset="2"/>
               <a:buNone/>
             </a:pPr>
-            <a:endParaRPr lang="en-US" sz="2800" dirty="0" smtClean="0"/>
+            <a:endParaRPr lang="en-US" sz="2800" dirty="0"/>
           </a:p>
           <a:p>
             <a:pPr marL="0" indent="0" algn="ctr" eaLnBrk="1" hangingPunct="1">
               <a:buFont typeface="Wingdings" pitchFamily="2" charset="2"/>
               <a:buNone/>
             </a:pPr>
-            <a:endParaRPr lang="en-US" sz="2800" dirty="0" smtClean="0"/>
+            <a:endParaRPr lang="en-US" sz="2800" dirty="0"/>
           </a:p>
         </p:txBody>
       </p:sp>
@@ -5030,9 +5018,9 @@
           <a:p>
             <a:fld id="{878D0E70-D567-4EAD-BEEC-D30EFDF84A73}" type="datetime1">
               <a:rPr lang="en-US" smtClean="0"/>
-              <a:t>11/29/2015</a:t>
+              <a:t>12/23/2016</a:t>
             </a:fld>
-            <a:endParaRPr lang="en-US" dirty="0" smtClean="0"/>
+            <a:endParaRPr lang="en-US" dirty="0"/>
           </a:p>
         </p:txBody>
       </p:sp>
@@ -5088,34 +5076,32 @@
       </p:sp>
       <p:pic>
         <p:nvPicPr>
-          <p:cNvPr id="6151" name="Picture 5" descr="tsWxGTUI_PyVx Masthead"/>
+          <p:cNvPr id="3" name="Picture 2"/>
           <p:cNvPicPr>
-            <a:picLocks noChangeAspect="1" noChangeArrowheads="1"/>
+            <a:picLocks noChangeAspect="1"/>
           </p:cNvPicPr>
           <p:nvPr/>
         </p:nvPicPr>
         <p:blipFill>
-          <a:blip r:embed="rId3"/>
-          <a:srcRect/>
+          <a:blip r:embed="rId3">
+            <a:extLst>
+              <a:ext uri="{28A0092B-C50C-407E-A947-70E740481C1C}">
+                <a14:useLocalDpi xmlns:a14="http://schemas.microsoft.com/office/drawing/2010/main" val="0"/>
+              </a:ext>
+            </a:extLst>
+          </a:blip>
           <a:stretch>
             <a:fillRect/>
           </a:stretch>
         </p:blipFill>
-        <p:spPr bwMode="auto">
+        <p:spPr>
           <a:xfrm>
-            <a:off x="1524000" y="2195513"/>
-            <a:ext cx="9196388" cy="2259012"/>
+            <a:off x="495300" y="2419350"/>
+            <a:ext cx="11144250" cy="3542100"/>
           </a:xfrm>
           <a:prstGeom prst="rect">
             <a:avLst/>
           </a:prstGeom>
-          <a:noFill/>
-          <a:ln w="9525">
-            <a:noFill/>
-            <a:miter lim="800000"/>
-            <a:headEnd/>
-            <a:tailEnd/>
-          </a:ln>
         </p:spPr>
       </p:pic>
     </p:spTree>
@@ -5124,13 +5110,6 @@
     <a:masterClrMapping/>
   </p:clrMapOvr>
   <p:transition/>
-  <p:timing>
-    <p:tnLst>
-      <p:par>
-        <p:cTn id="1" dur="indefinite" restart="never" nodeType="tmRoot"/>
-      </p:par>
-    </p:tnLst>
-  </p:timing>
 </p:sld>
 </file>
 
@@ -5167,31 +5146,27 @@
           <a:lstStyle/>
           <a:p>
             <a:pPr eaLnBrk="1" hangingPunct="1"/>
-            <a:r>
-              <a:rPr lang="en-US" sz="3200" dirty="0" smtClean="0"/>
-              <a:t/>
-            </a:r>
             <a:br>
-              <a:rPr lang="en-US" sz="3200" dirty="0" smtClean="0"/>
+              <a:rPr lang="en-US" sz="3200" dirty="0"/>
             </a:br>
             <a:r>
-              <a:rPr lang="en-US" dirty="0" smtClean="0"/>
+              <a:rPr lang="en-US" dirty="0"/>
               <a:t>Table of Contents </a:t>
             </a:r>
             <a:r>
-              <a:rPr lang="en-US" sz="2000" dirty="0" smtClean="0"/>
+              <a:rPr lang="en-US" sz="2000" dirty="0"/>
               <a:t>(</a:t>
             </a:r>
             <a:r>
-              <a:rPr lang="en-US" sz="2000" i="1" dirty="0" smtClean="0"/>
+              <a:rPr lang="en-US" sz="2000" i="1" dirty="0"/>
               <a:t>with slide show</a:t>
             </a:r>
             <a:r>
-              <a:rPr lang="en-US" sz="2000" dirty="0" smtClean="0"/>
+              <a:rPr lang="en-US" sz="2000" dirty="0"/>
               <a:t> </a:t>
             </a:r>
             <a:r>
-              <a:rPr lang="en-US" sz="2000" u="sng" dirty="0" smtClean="0">
+              <a:rPr lang="en-US" sz="2000" u="sng" dirty="0">
                 <a:solidFill>
                   <a:srgbClr val="FF0000"/>
                 </a:solidFill>
@@ -5199,7 +5174,7 @@
               <a:t>Hyperlinks</a:t>
             </a:r>
             <a:r>
-              <a:rPr lang="en-US" sz="2000" dirty="0" smtClean="0"/>
+              <a:rPr lang="en-US" sz="2000" dirty="0"/>
               <a:t>)</a:t>
             </a:r>
           </a:p>
@@ -5227,34 +5202,27 @@
               <a:rPr lang="en-US" sz="1800" b="1" dirty="0"/>
               <a:t>Collection of Slide Show Presentations</a:t>
             </a:r>
-            <a:endParaRPr lang="en-US" sz="1800" b="1" dirty="0" smtClean="0"/>
           </a:p>
           <a:p>
             <a:pPr eaLnBrk="1" hangingPunct="1"/>
             <a:r>
-              <a:rPr lang="en-US" sz="1600" b="1" dirty="0" smtClean="0"/>
+              <a:rPr lang="en-US" sz="1600" b="1" dirty="0"/>
               <a:t>Introduction</a:t>
             </a:r>
           </a:p>
           <a:p>
             <a:pPr lvl="1" eaLnBrk="1" hangingPunct="1"/>
             <a:r>
-              <a:rPr lang="en-US" sz="1400" i="1" dirty="0" smtClean="0">
+              <a:rPr lang="en-US" sz="1400" i="1" dirty="0">
                 <a:hlinkClick r:id="rId3" action="ppaction://hlinkpres?slideindex=1&amp;slidetitle="/>
               </a:rPr>
               <a:t>Team</a:t>
             </a:r>
             <a:r>
-              <a:rPr lang="en-US" sz="1400" dirty="0" smtClean="0">
-                <a:hlinkClick r:id="rId3" action="ppaction://hlinkpres?slideindex=1&amp;slidetitle="/>
-              </a:rPr>
-              <a:t>STARS </a:t>
-            </a:r>
-            <a:r>
               <a:rPr lang="en-US" sz="1400" dirty="0">
                 <a:hlinkClick r:id="rId3" action="ppaction://hlinkpres?slideindex=1&amp;slidetitle="/>
               </a:rPr>
-              <a:t>“tsWxGTUI_PyVx” Toolkit</a:t>
+              <a:t>STARS “tsWxGTUI_PyVx” Toolkit</a:t>
             </a:r>
             <a:r>
               <a:rPr lang="en-US" sz="1400" dirty="0"/>
@@ -5267,19 +5235,7 @@
               <a:rPr lang="en-US" sz="1600" dirty="0">
                 <a:hlinkClick r:id="rId4" action="ppaction://hlinksldjump"/>
               </a:rPr>
-              <a:t>Python (2x &amp; 3x</a:t>
-            </a:r>
-            <a:r>
-              <a:rPr lang="en-US" sz="1600" dirty="0" smtClean="0">
-                <a:hlinkClick r:id="rId4" action="ppaction://hlinksldjump"/>
-              </a:rPr>
-              <a:t>) </a:t>
-            </a:r>
-            <a:r>
-              <a:rPr lang="en-US" sz="1600" dirty="0">
-                <a:hlinkClick r:id="rId4" action="ppaction://hlinksldjump"/>
-              </a:rPr>
-              <a:t>virtual machines</a:t>
+              <a:t>Python (2x &amp; 3x) virtual machines</a:t>
             </a:r>
             <a:endParaRPr lang="en-US" sz="1600" dirty="0"/>
           </a:p>
@@ -5299,15 +5255,9 @@
               <a:rPr lang="en-US" sz="1600" dirty="0">
                 <a:hlinkClick r:id="rId6" action="ppaction://hlinksldjump"/>
               </a:rPr>
-              <a:t>Curses terminal control library and low level graphical </a:t>
-            </a:r>
-            <a:r>
-              <a:rPr lang="en-US" sz="1600" dirty="0" smtClean="0">
-                <a:hlinkClick r:id="rId6" action="ppaction://hlinksldjump"/>
-              </a:rPr>
-              <a:t>widgets</a:t>
-            </a:r>
-            <a:endParaRPr lang="en-US" sz="1600" dirty="0" smtClean="0"/>
+              <a:t>Curses terminal control library and low level graphical widgets</a:t>
+            </a:r>
+            <a:endParaRPr lang="en-US" sz="1600" dirty="0"/>
           </a:p>
           <a:p>
             <a:pPr eaLnBrk="1" hangingPunct="1"/>
@@ -5319,84 +5269,61 @@
             </a:r>
             <a:r>
               <a:rPr lang="en-US" sz="1600" dirty="0"/>
-              <a:t> </a:t>
-            </a:r>
-            <a:r>
-              <a:rPr lang="en-US" sz="1600" dirty="0" smtClean="0"/>
-              <a:t>(</a:t>
-            </a:r>
-            <a:r>
-              <a:rPr lang="en-US" sz="1600" i="1" dirty="0" smtClean="0"/>
-              <a:t>popup </a:t>
+              <a:t> (</a:t>
             </a:r>
             <a:r>
               <a:rPr lang="en-US" sz="1600" i="1" dirty="0"/>
-              <a:t>separate slide </a:t>
-            </a:r>
-            <a:r>
-              <a:rPr lang="en-US" sz="1600" i="1" dirty="0" smtClean="0"/>
-              <a:t>show)</a:t>
+              <a:t>popup separate slide show)</a:t>
             </a:r>
           </a:p>
           <a:p>
             <a:pPr lvl="1" eaLnBrk="1" hangingPunct="1"/>
             <a:r>
-              <a:rPr lang="en-US" sz="1600" dirty="0" smtClean="0"/>
+              <a:rPr lang="en-US" sz="1600" dirty="0"/>
               <a:t>Objectives</a:t>
             </a:r>
           </a:p>
           <a:p>
             <a:pPr lvl="2" eaLnBrk="1" hangingPunct="1"/>
             <a:r>
-              <a:rPr lang="en-US" sz="1200" dirty="0" smtClean="0"/>
+              <a:rPr lang="en-US" sz="1200" dirty="0"/>
               <a:t>Goals (Capabilities)</a:t>
             </a:r>
           </a:p>
           <a:p>
             <a:pPr lvl="2" eaLnBrk="1" hangingPunct="1"/>
             <a:r>
-              <a:rPr lang="en-US" sz="1200" dirty="0" smtClean="0"/>
+              <a:rPr lang="en-US" sz="1200" dirty="0"/>
               <a:t>Non-Goals (Limitations)</a:t>
             </a:r>
           </a:p>
           <a:p>
             <a:pPr lvl="1" eaLnBrk="1" hangingPunct="1"/>
             <a:r>
-              <a:rPr lang="en-US" sz="1600" dirty="0" smtClean="0"/>
+              <a:rPr lang="en-US" sz="1600" dirty="0"/>
               <a:t>Plans</a:t>
             </a:r>
           </a:p>
           <a:p>
             <a:pPr lvl="2" eaLnBrk="1" hangingPunct="1"/>
             <a:r>
-              <a:rPr lang="en-US" sz="1200" dirty="0" smtClean="0"/>
+              <a:rPr lang="en-US" sz="1200" dirty="0"/>
               <a:t>Technologies</a:t>
             </a:r>
-            <a:endParaRPr lang="en-US" sz="1200" dirty="0"/>
           </a:p>
           <a:p>
             <a:pPr lvl="2" eaLnBrk="1" hangingPunct="1"/>
             <a:r>
               <a:rPr lang="en-US" sz="1200" dirty="0"/>
-              <a:t>Design </a:t>
-            </a:r>
-            <a:r>
-              <a:rPr lang="en-US" sz="1200" dirty="0" smtClean="0"/>
-              <a:t>Decisions</a:t>
-            </a:r>
-            <a:endParaRPr lang="en-US" sz="1200" dirty="0"/>
+              <a:t>Design Decisions</a:t>
+            </a:r>
           </a:p>
           <a:p>
             <a:pPr lvl="2" eaLnBrk="1" hangingPunct="1"/>
             <a:r>
               <a:rPr lang="en-US" sz="1200" dirty="0"/>
-              <a:t>Release &amp; </a:t>
-            </a:r>
-            <a:r>
-              <a:rPr lang="en-US" sz="1200" dirty="0" smtClean="0"/>
-              <a:t>Publication</a:t>
-            </a:r>
-            <a:endParaRPr lang="en-US" sz="1200" dirty="0"/>
+              <a:t>Release &amp; Publication</a:t>
+            </a:r>
           </a:p>
         </p:txBody>
       </p:sp>
@@ -5424,19 +5351,11 @@
             </a:r>
             <a:r>
               <a:rPr lang="en-US" sz="1600" dirty="0"/>
-              <a:t> </a:t>
-            </a:r>
-            <a:r>
-              <a:rPr lang="en-US" sz="1600" dirty="0" smtClean="0"/>
-              <a:t>(</a:t>
-            </a:r>
-            <a:r>
-              <a:rPr lang="en-US" sz="1600" i="1" dirty="0" smtClean="0"/>
-              <a:t>popup </a:t>
+              <a:t> (</a:t>
             </a:r>
             <a:r>
               <a:rPr lang="en-US" sz="1600" i="1" dirty="0"/>
-              <a:t>separate slide show </a:t>
+              <a:t>popup separate slide show </a:t>
             </a:r>
             <a:r>
               <a:rPr lang="en-US" sz="1600" dirty="0"/>
@@ -5446,73 +5365,57 @@
           <a:p>
             <a:pPr lvl="1" eaLnBrk="1" hangingPunct="1"/>
             <a:r>
-              <a:rPr lang="en-US" sz="1600" dirty="0" smtClean="0"/>
+              <a:rPr lang="en-US" sz="1600" dirty="0"/>
               <a:t>Technologies</a:t>
             </a:r>
-            <a:endParaRPr lang="en-US" sz="1600" dirty="0"/>
           </a:p>
           <a:p>
             <a:pPr lvl="1" eaLnBrk="1" hangingPunct="1"/>
             <a:r>
               <a:rPr lang="en-US" sz="1600" dirty="0"/>
-              <a:t>Design </a:t>
-            </a:r>
-            <a:r>
-              <a:rPr lang="en-US" sz="1600" dirty="0" smtClean="0"/>
-              <a:t>Decisions</a:t>
-            </a:r>
-            <a:endParaRPr lang="en-US" sz="1600" dirty="0"/>
+              <a:t>Design Decisions</a:t>
+            </a:r>
           </a:p>
           <a:p>
             <a:pPr lvl="1" eaLnBrk="1" hangingPunct="1"/>
             <a:r>
               <a:rPr lang="en-US" sz="1600" dirty="0"/>
-              <a:t>Release &amp; </a:t>
-            </a:r>
-            <a:r>
-              <a:rPr lang="en-US" sz="1600" dirty="0" smtClean="0"/>
-              <a:t>Publication</a:t>
+              <a:t>Release &amp; Publication</a:t>
             </a:r>
           </a:p>
           <a:p>
             <a:pPr eaLnBrk="1" hangingPunct="1"/>
             <a:r>
-              <a:rPr lang="en-US" sz="1600" b="1" dirty="0" smtClean="0"/>
+              <a:rPr lang="en-US" sz="1600" b="1" dirty="0"/>
               <a:t>Use Cases</a:t>
             </a:r>
             <a:r>
-              <a:rPr lang="en-US" sz="1200" b="1" dirty="0" smtClean="0"/>
+              <a:rPr lang="en-US" sz="1200" b="1" dirty="0"/>
               <a:t> </a:t>
             </a:r>
             <a:r>
-              <a:rPr lang="en-US" sz="1600" dirty="0" smtClean="0"/>
+              <a:rPr lang="en-US" sz="1600" dirty="0"/>
               <a:t>(</a:t>
             </a:r>
             <a:r>
-              <a:rPr lang="en-US" sz="1600" i="1" dirty="0" smtClean="0"/>
+              <a:rPr lang="en-US" sz="1600" i="1" dirty="0"/>
               <a:t>popup separate slide show</a:t>
             </a:r>
             <a:r>
-              <a:rPr lang="en-US" sz="1600" dirty="0" smtClean="0"/>
+              <a:rPr lang="en-US" sz="1600" dirty="0"/>
               <a:t>)</a:t>
             </a:r>
-            <a:endParaRPr lang="en-US" sz="1400" dirty="0" smtClean="0"/>
+            <a:endParaRPr lang="en-US" sz="1400" dirty="0"/>
           </a:p>
           <a:p>
             <a:pPr marL="742950" lvl="2" indent="-342900">
               <a:buSzPct val="60000"/>
             </a:pPr>
             <a:r>
-              <a:rPr lang="en-US" sz="1600" dirty="0" smtClean="0">
-                <a:hlinkClick r:id="rId9" action="ppaction://hlinkpres?slideindex=1&amp;slidetitle="/>
-              </a:rPr>
-              <a:t>Sample </a:t>
-            </a:r>
-            <a:r>
               <a:rPr lang="en-US" sz="1600" dirty="0">
                 <a:hlinkClick r:id="rId9" action="ppaction://hlinkpres?slideindex=1&amp;slidetitle="/>
               </a:rPr>
-              <a:t>Screen Shots</a:t>
+              <a:t>Sample Screen Shots</a:t>
             </a:r>
             <a:endParaRPr lang="en-US" sz="1600" dirty="0"/>
           </a:p>
@@ -5569,36 +5472,36 @@
               <a:buSzPct val="60000"/>
             </a:pPr>
             <a:r>
-              <a:rPr lang="en-US" sz="1600" dirty="0" err="1" smtClean="0">
+              <a:rPr lang="en-US" sz="1600" dirty="0" err="1">
                 <a:hlinkClick r:id="rId14" action="ppaction://hlinkpres?slideindex=1&amp;slidetitle="/>
               </a:rPr>
               <a:t>Embedded_System_Interface</a:t>
             </a:r>
-            <a:endParaRPr lang="en-US" sz="1600" dirty="0" smtClean="0"/>
+            <a:endParaRPr lang="en-US" sz="1600" dirty="0"/>
           </a:p>
           <a:p>
             <a:pPr marL="742950" lvl="2" indent="-342900">
               <a:buSzPct val="60000"/>
             </a:pPr>
             <a:r>
-              <a:rPr lang="en-US" sz="1600" dirty="0" err="1" smtClean="0">
+              <a:rPr lang="en-US" sz="1600" dirty="0" err="1">
                 <a:hlinkClick r:id="rId15" action="ppaction://hlinkpres?slideindex=1&amp;slidetitle="/>
               </a:rPr>
               <a:t>Source_Distributions</a:t>
             </a:r>
-            <a:endParaRPr lang="en-US" sz="1600" dirty="0" smtClean="0"/>
+            <a:endParaRPr lang="en-US" sz="1600" dirty="0"/>
           </a:p>
           <a:p>
             <a:pPr marL="742950" lvl="2" indent="-342900">
               <a:buSzPct val="60000"/>
             </a:pPr>
             <a:r>
-              <a:rPr lang="en-US" sz="1600" dirty="0" smtClean="0">
+              <a:rPr lang="en-US" sz="1600" dirty="0">
                 <a:hlinkClick r:id="rId16" action="ppaction://hlinkpres?slideindex=1&amp;slidetitle="/>
               </a:rPr>
               <a:t>ManPages</a:t>
             </a:r>
-            <a:endParaRPr lang="en-US" sz="1600" dirty="0" smtClean="0"/>
+            <a:endParaRPr lang="en-US" sz="1600" dirty="0"/>
           </a:p>
         </p:txBody>
       </p:sp>
@@ -5621,9 +5524,9 @@
           <a:p>
             <a:fld id="{594743C1-DE31-4E12-9F9F-1BA9DE6E7B96}" type="datetime1">
               <a:rPr lang="en-US" smtClean="0"/>
-              <a:t>11/29/2015</a:t>
+              <a:t>12/23/2016</a:t>
             </a:fld>
-            <a:endParaRPr lang="en-US" dirty="0" smtClean="0"/>
+            <a:endParaRPr lang="en-US" dirty="0"/>
           </a:p>
         </p:txBody>
       </p:sp>
@@ -5683,13 +5586,6 @@
     <a:masterClrMapping/>
   </p:clrMapOvr>
   <p:transition/>
-  <p:timing>
-    <p:tnLst>
-      <p:par>
-        <p:cTn id="1" dur="indefinite" restart="never" nodeType="tmRoot"/>
-      </p:par>
-    </p:tnLst>
-  </p:timing>
 </p:sld>
 </file>
 
@@ -5726,20 +5622,16 @@
           <a:lstStyle/>
           <a:p>
             <a:r>
-              <a:rPr lang="en-US" i="1" dirty="0" err="1" smtClean="0"/>
+              <a:rPr lang="en-US" i="1" dirty="0" err="1"/>
               <a:t>Team</a:t>
             </a:r>
             <a:r>
-              <a:rPr lang="en-US" dirty="0" err="1" smtClean="0"/>
+              <a:rPr lang="en-US" dirty="0" err="1"/>
               <a:t>STARS</a:t>
             </a:r>
             <a:r>
-              <a:rPr lang="en-US" dirty="0" smtClean="0"/>
-              <a:t> </a:t>
-            </a:r>
-            <a:r>
               <a:rPr lang="en-US" dirty="0"/>
-              <a:t>“tsWxGTUI_PyVx” Toolkit </a:t>
+              <a:t> “tsWxGTUI_PyVx” Toolkit </a:t>
             </a:r>
             <a:r>
               <a:rPr lang="en-US" sz="2000" dirty="0"/>
@@ -5776,167 +5668,111 @@
           <a:p>
             <a:r>
               <a:rPr lang="en-US" sz="2400" dirty="0"/>
-              <a:t>It is a </a:t>
-            </a:r>
-            <a:r>
-              <a:rPr lang="en-US" sz="2400" dirty="0" smtClean="0"/>
-              <a:t>productive, software development toolkit </a:t>
-            </a:r>
+              <a:t>It is a productive, software development toolkit for rapidly prototyping platform-independent application programs for embedded systems.</a:t>
+            </a:r>
+          </a:p>
+          <a:p>
             <a:r>
               <a:rPr lang="en-US" sz="2400" dirty="0"/>
-              <a:t>for rapidly prototyping </a:t>
-            </a:r>
-            <a:r>
-              <a:rPr lang="en-US" sz="2400" dirty="0" smtClean="0"/>
-              <a:t>platform-independent application programs for embedded </a:t>
-            </a:r>
-            <a:r>
-              <a:rPr lang="en-US" sz="2400" dirty="0"/>
-              <a:t>systems.</a:t>
-            </a:r>
-          </a:p>
-          <a:p>
-            <a:r>
-              <a:rPr lang="en-US" sz="2400" dirty="0" smtClean="0"/>
               <a:t>It takes advantage of the cross-platform capabilities of:</a:t>
             </a:r>
           </a:p>
           <a:p>
             <a:pPr lvl="1"/>
             <a:r>
-              <a:rPr lang="en-US" sz="2000" dirty="0" smtClean="0"/>
+              <a:rPr lang="en-US" sz="2000" dirty="0"/>
               <a:t>“</a:t>
             </a:r>
             <a:r>
-              <a:rPr lang="en-US" sz="2000" b="1" dirty="0" smtClean="0">
+              <a:rPr lang="en-US" sz="2000" b="1" dirty="0">
                 <a:hlinkClick r:id="rId3"/>
               </a:rPr>
               <a:t>Python</a:t>
             </a:r>
             <a:r>
-              <a:rPr lang="en-US" sz="2000" b="1" dirty="0" smtClean="0"/>
+              <a:rPr lang="en-US" sz="2000" b="1" dirty="0"/>
               <a:t> </a:t>
             </a:r>
             <a:r>
-              <a:rPr lang="en-US" sz="2000" dirty="0" smtClean="0"/>
-              <a:t>WEB browser link” (2x </a:t>
-            </a:r>
-            <a:r>
               <a:rPr lang="en-US" sz="2000" dirty="0"/>
-              <a:t>&amp; </a:t>
-            </a:r>
-            <a:r>
-              <a:rPr lang="en-US" sz="2000" dirty="0" smtClean="0"/>
-              <a:t>3x, </a:t>
-            </a:r>
+              <a:t>WEB browser link” (2x &amp; 3x, which are implemented in C/C++) programming languages. interpreters and virtual machines </a:t>
+            </a:r>
+          </a:p>
+          <a:p>
+            <a:pPr lvl="1"/>
             <a:r>
               <a:rPr lang="en-US" sz="2000" dirty="0"/>
-              <a:t>which are implemented in C/C</a:t>
-            </a:r>
-            <a:r>
-              <a:rPr lang="en-US" sz="2000" dirty="0" smtClean="0"/>
-              <a:t>++) programming languages. interpreters </a:t>
-            </a:r>
-            <a:r>
-              <a:rPr lang="en-US" sz="2000" dirty="0"/>
-              <a:t>and virtual </a:t>
-            </a:r>
-            <a:r>
-              <a:rPr lang="en-US" sz="2000" dirty="0" smtClean="0"/>
-              <a:t>machines </a:t>
-            </a:r>
-          </a:p>
-          <a:p>
-            <a:pPr lvl="1"/>
-            <a:r>
-              <a:rPr lang="en-US" sz="2000" dirty="0" smtClean="0"/>
               <a:t>“</a:t>
             </a:r>
             <a:r>
-              <a:rPr lang="en-US" sz="2000" b="1" dirty="0" err="1" smtClean="0">
+              <a:rPr lang="en-US" sz="2000" b="1" dirty="0" err="1">
                 <a:hlinkClick r:id="rId4"/>
               </a:rPr>
               <a:t>wxPython</a:t>
             </a:r>
             <a:r>
-              <a:rPr lang="en-US" sz="2000" b="1" dirty="0" smtClean="0"/>
+              <a:rPr lang="en-US" sz="2000" b="1" dirty="0"/>
               <a:t> </a:t>
             </a:r>
             <a:r>
-              <a:rPr lang="en-US" sz="2000" dirty="0" smtClean="0"/>
+              <a:rPr lang="en-US" sz="2000" dirty="0"/>
               <a:t>WEB browser link” (Python wrapper for “</a:t>
             </a:r>
             <a:r>
-              <a:rPr lang="en-US" sz="2000" b="1" dirty="0" err="1" smtClean="0">
+              <a:rPr lang="en-US" sz="2000" b="1" dirty="0" err="1">
                 <a:hlinkClick r:id="rId5"/>
               </a:rPr>
               <a:t>wxWidgets</a:t>
             </a:r>
             <a:r>
-              <a:rPr lang="en-US" sz="2000" b="1" dirty="0" smtClean="0"/>
+              <a:rPr lang="en-US" sz="2000" b="1" dirty="0"/>
               <a:t> </a:t>
             </a:r>
             <a:r>
-              <a:rPr lang="en-US" sz="2000" dirty="0" smtClean="0"/>
+              <a:rPr lang="en-US" sz="2000" dirty="0"/>
               <a:t>WEB browser link”, which itself is implemented in C/C++) high level, pixel-mode, graphical widget application programming interface</a:t>
             </a:r>
           </a:p>
           <a:p>
             <a:pPr lvl="1"/>
             <a:r>
-              <a:rPr lang="en-US" sz="2000" dirty="0" smtClean="0"/>
+              <a:rPr lang="en-US" sz="2000" dirty="0"/>
               <a:t>“</a:t>
             </a:r>
             <a:r>
-              <a:rPr lang="en-US" sz="2000" b="1" dirty="0" smtClean="0">
+              <a:rPr lang="en-US" sz="2000" b="1" dirty="0">
                 <a:hlinkClick r:id="rId6"/>
               </a:rPr>
               <a:t>Curses</a:t>
             </a:r>
             <a:r>
-              <a:rPr lang="en-US" sz="2000" b="1" dirty="0" smtClean="0"/>
+              <a:rPr lang="en-US" sz="2000" b="1" dirty="0"/>
               <a:t> </a:t>
             </a:r>
             <a:r>
-              <a:rPr lang="en-US" sz="2000" dirty="0" smtClean="0"/>
+              <a:rPr lang="en-US" sz="2000" dirty="0"/>
               <a:t>WEB browser link” (traditional for Unix or new “</a:t>
             </a:r>
             <a:r>
-              <a:rPr lang="en-US" sz="2000" b="1" dirty="0" err="1" smtClean="0">
+              <a:rPr lang="en-US" sz="2000" b="1" dirty="0" err="1">
                 <a:hlinkClick r:id="rId7"/>
               </a:rPr>
               <a:t>nCurses</a:t>
             </a:r>
             <a:r>
-              <a:rPr lang="en-US" sz="2000" b="1" dirty="0" smtClean="0"/>
+              <a:rPr lang="en-US" sz="2000" b="1" dirty="0"/>
               <a:t> </a:t>
             </a:r>
             <a:r>
-              <a:rPr lang="en-US" sz="2000" dirty="0" smtClean="0"/>
-              <a:t>WEB browser link” for Linux, which are implemented in C/C++) </a:t>
-            </a:r>
-            <a:r>
               <a:rPr lang="en-US" sz="2000" dirty="0"/>
-              <a:t>terminal control library </a:t>
-            </a:r>
-            <a:r>
-              <a:rPr lang="en-US" sz="2000" dirty="0" smtClean="0"/>
-              <a:t>and low level, text-mode, graphical-style </a:t>
-            </a:r>
-            <a:r>
-              <a:rPr lang="en-US" sz="2000" dirty="0"/>
-              <a:t>widget application programming </a:t>
-            </a:r>
-            <a:r>
-              <a:rPr lang="en-US" sz="2000" dirty="0" smtClean="0"/>
-              <a:t>interface</a:t>
+              <a:t>WEB browser link” for Linux, which are implemented in C/C++) terminal control library and low level, text-mode, graphical-style widget application programming interface</a:t>
             </a:r>
           </a:p>
           <a:p>
             <a:pPr marL="0" indent="0">
               <a:buNone/>
             </a:pPr>
-            <a:endParaRPr lang="en-US" sz="1400" dirty="0" smtClean="0"/>
+            <a:endParaRPr lang="en-US" sz="1400" dirty="0"/>
           </a:p>
         </p:txBody>
       </p:sp>
@@ -5960,7 +5796,7 @@
             </a:pPr>
             <a:fld id="{FB277746-3C8E-4161-A66B-B97D4FD5213A}" type="datetime1">
               <a:rPr lang="en-US" smtClean="0"/>
-              <a:t>11/29/2015</a:t>
+              <a:t>12/23/2016</a:t>
             </a:fld>
             <a:endParaRPr lang="en-US" dirty="0"/>
           </a:p>
@@ -5985,10 +5821,9 @@
               <a:defRPr/>
             </a:pPr>
             <a:r>
-              <a:rPr lang="en-US" dirty="0" smtClean="0"/>
+              <a:rPr lang="en-US" dirty="0"/>
               <a:t>TeamSTARS "tsWxGTUI_PyVx" Toolkit prepared &amp; presented by Richard S. Gordon</a:t>
             </a:r>
-            <a:endParaRPr lang="en-US" dirty="0"/>
           </a:p>
         </p:txBody>
       </p:sp>
@@ -6026,13 +5861,6 @@
   <p:clrMapOvr>
     <a:masterClrMapping/>
   </p:clrMapOvr>
-  <p:timing>
-    <p:tnLst>
-      <p:par>
-        <p:cTn id="1" dur="indefinite" restart="never" nodeType="tmRoot"/>
-      </p:par>
-    </p:tnLst>
-  </p:timing>
 </p:sld>
 </file>
 
@@ -6069,12 +5897,8 @@
           <a:lstStyle/>
           <a:p>
             <a:r>
-              <a:rPr lang="en-US" dirty="0" smtClean="0"/>
-              <a:t>Python Programming </a:t>
-            </a:r>
-            <a:r>
               <a:rPr lang="en-US" dirty="0"/>
-              <a:t>Language </a:t>
+              <a:t>Python Programming Language </a:t>
             </a:r>
             <a:r>
               <a:rPr lang="en-US" sz="2000" dirty="0"/>
@@ -6119,46 +5943,21 @@
           </a:p>
           <a:p>
             <a:r>
-              <a:rPr lang="en-US" sz="2400" dirty="0" smtClean="0"/>
-              <a:t>“Python </a:t>
-            </a:r>
-            <a:r>
               <a:rPr lang="en-US" sz="2400" dirty="0"/>
-              <a:t>is a widely used general-purpose, high-level programming language</a:t>
-            </a:r>
-            <a:r>
-              <a:rPr lang="en-US" sz="2400" dirty="0" smtClean="0"/>
-              <a:t>.”</a:t>
-            </a:r>
-          </a:p>
-          <a:p>
-            <a:r>
-              <a:rPr lang="en-US" sz="2400" dirty="0" smtClean="0"/>
-              <a:t>“Its </a:t>
-            </a:r>
+              <a:t>“Python is a widely used general-purpose, high-level programming language.”</a:t>
+            </a:r>
+          </a:p>
+          <a:p>
             <a:r>
               <a:rPr lang="en-US" sz="2400" dirty="0"/>
-              <a:t>design philosophy emphasizes code readability, and its syntax allows programmers to express concepts in fewer lines of code than would be possible in languages such as C++ or Java</a:t>
-            </a:r>
-            <a:r>
-              <a:rPr lang="en-US" sz="2400" dirty="0" smtClean="0"/>
-              <a:t>.”</a:t>
-            </a:r>
-          </a:p>
-          <a:p>
-            <a:r>
-              <a:rPr lang="en-US" sz="2400" dirty="0" smtClean="0"/>
-              <a:t>“The </a:t>
-            </a:r>
+              <a:t>“Its design philosophy emphasizes code readability, and its syntax allows programmers to express concepts in fewer lines of code than would be possible in languages such as C++ or Java.”</a:t>
+            </a:r>
+          </a:p>
+          <a:p>
             <a:r>
               <a:rPr lang="en-US" sz="2400" dirty="0"/>
-              <a:t>language provides constructs intended to enable clear programs on both a small and large scale</a:t>
-            </a:r>
-            <a:r>
-              <a:rPr lang="en-US" sz="2400" dirty="0" smtClean="0"/>
-              <a:t>.”</a:t>
-            </a:r>
-            <a:endParaRPr lang="en-US" sz="2400" dirty="0"/>
+              <a:t>“The language provides constructs intended to enable clear programs on both a small and large scale.”</a:t>
+            </a:r>
           </a:p>
         </p:txBody>
       </p:sp>
@@ -6182,7 +5981,7 @@
             </a:pPr>
             <a:fld id="{65B11A62-63AA-4067-ACEB-AA6A42CE3A38}" type="datetime1">
               <a:rPr lang="en-US" smtClean="0"/>
-              <a:t>11/29/2015</a:t>
+              <a:t>12/23/2016</a:t>
             </a:fld>
             <a:endParaRPr lang="en-US"/>
           </a:p>
@@ -6207,10 +6006,9 @@
               <a:defRPr/>
             </a:pPr>
             <a:r>
-              <a:rPr lang="en-US" dirty="0" smtClean="0"/>
+              <a:rPr lang="en-US" dirty="0"/>
               <a:t>TeamSTARS "tsWxGTUI_PyVx" Toolkit prepared &amp; presented by Richard S. Gordon</a:t>
             </a:r>
-            <a:endParaRPr lang="en-US" dirty="0"/>
           </a:p>
         </p:txBody>
       </p:sp>
@@ -6248,13 +6046,6 @@
   <p:clrMapOvr>
     <a:masterClrMapping/>
   </p:clrMapOvr>
-  <p:timing>
-    <p:tnLst>
-      <p:par>
-        <p:cTn id="1" dur="indefinite" restart="never" nodeType="tmRoot"/>
-      </p:par>
-    </p:tnLst>
-  </p:timing>
 </p:sld>
 </file>
 
@@ -6291,12 +6082,8 @@
           <a:lstStyle/>
           <a:p>
             <a:r>
-              <a:rPr lang="en-US" dirty="0" smtClean="0"/>
-              <a:t>wxPython Graphical User Interface </a:t>
-            </a:r>
-            <a:r>
               <a:rPr lang="en-US" dirty="0"/>
-              <a:t>API </a:t>
+              <a:t>wxPython Graphical User Interface API </a:t>
             </a:r>
             <a:r>
               <a:rPr lang="en-US" sz="2000" dirty="0"/>
@@ -6340,63 +6127,27 @@
           </a:p>
           <a:p>
             <a:r>
-              <a:rPr lang="en-US" sz="2400" dirty="0" smtClean="0"/>
-              <a:t>“wxPython </a:t>
-            </a:r>
-            <a:r>
               <a:rPr lang="en-US" sz="2400" dirty="0"/>
-              <a:t>is a wrapper for the cross-platform GUI API (often referred to as a 'toolkit') </a:t>
-            </a:r>
-            <a:r>
-              <a:rPr lang="en-US" sz="2400" dirty="0" smtClean="0"/>
-              <a:t>wxWidgets </a:t>
-            </a:r>
+              <a:t>“wxPython is a wrapper for the cross-platform GUI API (often referred to as a 'toolkit') wxWidgets (which is written in C++) for the Python programming language.”</a:t>
+            </a:r>
+          </a:p>
+          <a:p>
+            <a:pPr lvl="1"/>
+            <a:r>
+              <a:rPr lang="en-US" sz="1600" dirty="0"/>
+              <a:t>“In computer programming, an application programming interface (API) is a set of routines, protocols, and tools for building software applications. An API expresses a software component in terms of its operations, inputs, outputs, and underlying types. An API defines functionalities that are independent of their respective implementations, which allows definitions and implementations to vary without compromising the interface. A good API makes it easier to develop a program by providing all the building blocks. A programmer then puts the blocks together.”</a:t>
+            </a:r>
+          </a:p>
+          <a:p>
             <a:r>
               <a:rPr lang="en-US" sz="2400" dirty="0"/>
-              <a:t>(which is written in C++) for the Python programming language</a:t>
-            </a:r>
-            <a:r>
-              <a:rPr lang="en-US" sz="2400" dirty="0" smtClean="0"/>
-              <a:t>.”</a:t>
-            </a:r>
-          </a:p>
-          <a:p>
-            <a:pPr lvl="1"/>
-            <a:r>
-              <a:rPr lang="en-US" sz="1600" dirty="0"/>
-              <a:t>“In computer programming, an application programming interface (API) is a set of routines, protocols, and tools for building software applications. An API expresses a software component in terms of its operations, inputs, outputs, and underlying types. An API defines functionalities that are independent of their respective implementations, which allows definitions and implementations to vary without compromising the interface. A good API makes it easier to develop a program by providing all the building blocks. A programmer then puts the blocks together</a:t>
-            </a:r>
-            <a:r>
-              <a:rPr lang="en-US" sz="1600" dirty="0" smtClean="0"/>
-              <a:t>.”</a:t>
-            </a:r>
-          </a:p>
-          <a:p>
-            <a:r>
-              <a:rPr lang="en-US" sz="2400" dirty="0" smtClean="0"/>
-              <a:t>“It </a:t>
-            </a:r>
+              <a:t>“It is implemented as a Python extension module (native code).“</a:t>
+            </a:r>
+          </a:p>
+          <a:p>
             <a:r>
               <a:rPr lang="en-US" sz="2400" dirty="0"/>
-              <a:t>is implemented as a Python extension module (native code</a:t>
-            </a:r>
-            <a:r>
-              <a:rPr lang="en-US" sz="2400" dirty="0" smtClean="0"/>
-              <a:t>).“</a:t>
-            </a:r>
-          </a:p>
-          <a:p>
-            <a:r>
-              <a:rPr lang="en-US" sz="2400" dirty="0" smtClean="0"/>
-              <a:t>“Like </a:t>
-            </a:r>
-            <a:r>
-              <a:rPr lang="en-US" sz="2400" dirty="0"/>
-              <a:t>wxWidgets, wxPython is free software</a:t>
-            </a:r>
-            <a:r>
-              <a:rPr lang="en-US" sz="2400" dirty="0" smtClean="0"/>
-              <a:t>.”</a:t>
+              <a:t>“Like wxWidgets, wxPython is free software.”</a:t>
             </a:r>
           </a:p>
         </p:txBody>
@@ -6421,7 +6172,7 @@
             </a:pPr>
             <a:fld id="{65B11A62-63AA-4067-ACEB-AA6A42CE3A38}" type="datetime1">
               <a:rPr lang="en-US" smtClean="0"/>
-              <a:t>11/29/2015</a:t>
+              <a:t>12/23/2016</a:t>
             </a:fld>
             <a:endParaRPr lang="en-US"/>
           </a:p>
@@ -6446,10 +6197,9 @@
               <a:defRPr/>
             </a:pPr>
             <a:r>
-              <a:rPr lang="en-US" dirty="0" smtClean="0"/>
+              <a:rPr lang="en-US" dirty="0"/>
               <a:t>TeamSTARS "tsWxGTUI_PyVx" Toolkit prepared &amp; presented by Richard S. Gordon</a:t>
             </a:r>
-            <a:endParaRPr lang="en-US" dirty="0"/>
           </a:p>
         </p:txBody>
       </p:sp>
@@ -6487,13 +6237,6 @@
   <p:clrMapOvr>
     <a:masterClrMapping/>
   </p:clrMapOvr>
-  <p:timing>
-    <p:tnLst>
-      <p:par>
-        <p:cTn id="1" dur="indefinite" restart="never" nodeType="tmRoot"/>
-      </p:par>
-    </p:tnLst>
-  </p:timing>
 </p:sld>
 </file>
 
@@ -6531,11 +6274,7 @@
           <a:p>
             <a:r>
               <a:rPr lang="en-US" dirty="0"/>
-              <a:t>Curses Terminal Control Library 1 of </a:t>
-            </a:r>
-            <a:r>
-              <a:rPr lang="en-US" dirty="0" smtClean="0"/>
-              <a:t>2 </a:t>
+              <a:t>Curses Terminal Control Library 1 of 2 </a:t>
             </a:r>
             <a:r>
               <a:rPr lang="en-US" sz="2000" dirty="0"/>
@@ -6548,7 +6287,7 @@
               <a:t>Table of Contents</a:t>
             </a:r>
             <a:r>
-              <a:rPr lang="en-US" sz="2000" dirty="0" smtClean="0"/>
+              <a:rPr lang="en-US" sz="2000" dirty="0"/>
               <a:t>)</a:t>
             </a:r>
             <a:endParaRPr lang="en-US" sz="3200" dirty="0"/>
@@ -6580,33 +6319,16 @@
           </a:p>
           <a:p>
             <a:r>
-              <a:rPr lang="en-US" sz="2800" dirty="0" smtClean="0"/>
-              <a:t>“Curses-based </a:t>
-            </a:r>
-            <a:r>
               <a:rPr lang="en-US" sz="2800" dirty="0"/>
-              <a:t>software is software whose user interface is implemented through the Curses library, or a compatible library (such as </a:t>
-            </a:r>
-            <a:r>
-              <a:rPr lang="en-US" sz="2800" dirty="0" smtClean="0"/>
-              <a:t>New Curses).”</a:t>
+              <a:t>“Curses-based software is software whose user interface is implemented through the Curses library, or a compatible library (such as New Curses).”</a:t>
             </a:r>
             <a:endParaRPr lang="en-US" sz="2800" u="sng" dirty="0"/>
           </a:p>
           <a:p>
             <a:r>
-              <a:rPr lang="en-US" sz="2800" dirty="0" smtClean="0"/>
-              <a:t>“Curses </a:t>
-            </a:r>
-            <a:r>
               <a:rPr lang="en-US" sz="2800" dirty="0"/>
-              <a:t>is designed to facilitate GUI-like functionality on a text-only device, such as a PC running in console mode, a hardware ANSI terminal, a Telnet or SSH client, or similar</a:t>
-            </a:r>
-            <a:r>
-              <a:rPr lang="en-US" sz="2800" dirty="0" smtClean="0"/>
-              <a:t>.”</a:t>
-            </a:r>
-            <a:endParaRPr lang="en-US" sz="2800" dirty="0"/>
+              <a:t>“Curses is designed to facilitate GUI-like functionality on a text-only device, such as a PC running in console mode, a hardware ANSI terminal, a Telnet or SSH client, or similar.”</a:t>
+            </a:r>
           </a:p>
         </p:txBody>
       </p:sp>
@@ -6630,7 +6352,7 @@
             </a:pPr>
             <a:fld id="{65B11A62-63AA-4067-ACEB-AA6A42CE3A38}" type="datetime1">
               <a:rPr lang="en-US" smtClean="0"/>
-              <a:t>11/29/2015</a:t>
+              <a:t>12/23/2016</a:t>
             </a:fld>
             <a:endParaRPr lang="en-US" dirty="0"/>
           </a:p>
@@ -6655,10 +6377,9 @@
               <a:defRPr/>
             </a:pPr>
             <a:r>
-              <a:rPr lang="en-US" dirty="0" smtClean="0"/>
+              <a:rPr lang="en-US" dirty="0"/>
               <a:t>TeamSTARS "tsWxGTUI_PyVx" Toolkit prepared &amp; presented by Richard S. Gordon</a:t>
             </a:r>
-            <a:endParaRPr lang="en-US" dirty="0"/>
           </a:p>
         </p:txBody>
       </p:sp>
@@ -6696,13 +6417,6 @@
   <p:clrMapOvr>
     <a:masterClrMapping/>
   </p:clrMapOvr>
-  <p:timing>
-    <p:tnLst>
-      <p:par>
-        <p:cTn id="1" dur="indefinite" restart="never" nodeType="tmRoot"/>
-      </p:par>
-    </p:tnLst>
-  </p:timing>
 </p:sld>
 </file>
 
@@ -6740,11 +6454,7 @@
           <a:p>
             <a:r>
               <a:rPr lang="en-US" dirty="0"/>
-              <a:t>Curses Terminal Control Library 2 of </a:t>
-            </a:r>
-            <a:r>
-              <a:rPr lang="en-US" dirty="0" smtClean="0"/>
-              <a:t>2 </a:t>
+              <a:t>Curses Terminal Control Library 2 of 2 </a:t>
             </a:r>
             <a:r>
               <a:rPr lang="en-US" sz="2000" dirty="0"/>
@@ -6757,7 +6467,7 @@
               <a:t>Table of Contents</a:t>
             </a:r>
             <a:r>
-              <a:rPr lang="en-US" sz="2000" dirty="0" smtClean="0"/>
+              <a:rPr lang="en-US" sz="2000" dirty="0"/>
               <a:t>)</a:t>
             </a:r>
             <a:endParaRPr lang="en-US" sz="3200" dirty="0"/>
@@ -6780,16 +6490,8 @@
           <a:lstStyle/>
           <a:p>
             <a:r>
-              <a:rPr lang="en-US" sz="2800" dirty="0" smtClean="0"/>
-              <a:t>“Curses-based </a:t>
-            </a:r>
-            <a:r>
               <a:rPr lang="en-US" sz="2800" dirty="0"/>
-              <a:t>programs often have a user interface that resembles a traditional graphical user interface, including 'widgets' such as text boxes and scrollable lists, rather than the command line interface (CLI) most commonly found on text-only devices. This can make them more user-friendly than a CLI-based program, while still being able to run on text-only devices</a:t>
-            </a:r>
-            <a:r>
-              <a:rPr lang="en-US" sz="2800" dirty="0" smtClean="0"/>
-              <a:t>.”</a:t>
+              <a:t>“Curses-based programs often have a user interface that resembles a traditional graphical user interface, including 'widgets' such as text boxes and scrollable lists, rather than the command line interface (CLI) most commonly found on text-only devices. This can make them more user-friendly than a CLI-based program, while still being able to run on text-only devices.”</a:t>
             </a:r>
             <a:endParaRPr lang="en-US" sz="2800" u="sng" dirty="0"/>
           </a:p>
@@ -6815,7 +6517,7 @@
             </a:pPr>
             <a:fld id="{65B11A62-63AA-4067-ACEB-AA6A42CE3A38}" type="datetime1">
               <a:rPr lang="en-US" smtClean="0"/>
-              <a:t>11/29/2015</a:t>
+              <a:t>12/23/2016</a:t>
             </a:fld>
             <a:endParaRPr lang="en-US"/>
           </a:p>
@@ -6840,10 +6542,9 @@
               <a:defRPr/>
             </a:pPr>
             <a:r>
-              <a:rPr lang="en-US" dirty="0" smtClean="0"/>
+              <a:rPr lang="en-US" dirty="0"/>
               <a:t>TeamSTARS "tsWxGTUI_PyVx" Toolkit prepared &amp; presented by Richard S. Gordon</a:t>
             </a:r>
-            <a:endParaRPr lang="en-US" dirty="0"/>
           </a:p>
         </p:txBody>
       </p:sp>
@@ -6881,13 +6582,6 @@
   <p:clrMapOvr>
     <a:masterClrMapping/>
   </p:clrMapOvr>
-  <p:timing>
-    <p:tnLst>
-      <p:par>
-        <p:cTn id="1" dur="indefinite" restart="never" nodeType="tmRoot"/>
-      </p:par>
-    </p:tnLst>
-  </p:timing>
 </p:sld>
 </file>
 

</xml_diff>